<commit_message>
Fixing introduction and images needed.
</commit_message>
<xml_diff>
--- a/docs/resources/Fig16_2.pptx
+++ b/docs/resources/Fig16_2.pptx
@@ -259,7 +259,7 @@
           <a:p>
             <a:fld id="{89C48F96-F5DF-4FE2-ADA7-494B7CCFAB53}" type="datetimeFigureOut">
               <a:rPr lang="es-ES" smtClean="0"/>
-              <a:t>24/05/2019</a:t>
+              <a:t>29/05/2019</a:t>
             </a:fld>
             <a:endParaRPr lang="es-ES"/>
           </a:p>
@@ -457,7 +457,7 @@
           <a:p>
             <a:fld id="{89C48F96-F5DF-4FE2-ADA7-494B7CCFAB53}" type="datetimeFigureOut">
               <a:rPr lang="es-ES" smtClean="0"/>
-              <a:t>24/05/2019</a:t>
+              <a:t>29/05/2019</a:t>
             </a:fld>
             <a:endParaRPr lang="es-ES"/>
           </a:p>
@@ -665,7 +665,7 @@
           <a:p>
             <a:fld id="{89C48F96-F5DF-4FE2-ADA7-494B7CCFAB53}" type="datetimeFigureOut">
               <a:rPr lang="es-ES" smtClean="0"/>
-              <a:t>24/05/2019</a:t>
+              <a:t>29/05/2019</a:t>
             </a:fld>
             <a:endParaRPr lang="es-ES"/>
           </a:p>
@@ -863,7 +863,7 @@
           <a:p>
             <a:fld id="{89C48F96-F5DF-4FE2-ADA7-494B7CCFAB53}" type="datetimeFigureOut">
               <a:rPr lang="es-ES" smtClean="0"/>
-              <a:t>24/05/2019</a:t>
+              <a:t>29/05/2019</a:t>
             </a:fld>
             <a:endParaRPr lang="es-ES"/>
           </a:p>
@@ -1138,7 +1138,7 @@
           <a:p>
             <a:fld id="{89C48F96-F5DF-4FE2-ADA7-494B7CCFAB53}" type="datetimeFigureOut">
               <a:rPr lang="es-ES" smtClean="0"/>
-              <a:t>24/05/2019</a:t>
+              <a:t>29/05/2019</a:t>
             </a:fld>
             <a:endParaRPr lang="es-ES"/>
           </a:p>
@@ -1403,7 +1403,7 @@
           <a:p>
             <a:fld id="{89C48F96-F5DF-4FE2-ADA7-494B7CCFAB53}" type="datetimeFigureOut">
               <a:rPr lang="es-ES" smtClean="0"/>
-              <a:t>24/05/2019</a:t>
+              <a:t>29/05/2019</a:t>
             </a:fld>
             <a:endParaRPr lang="es-ES"/>
           </a:p>
@@ -1815,7 +1815,7 @@
           <a:p>
             <a:fld id="{89C48F96-F5DF-4FE2-ADA7-494B7CCFAB53}" type="datetimeFigureOut">
               <a:rPr lang="es-ES" smtClean="0"/>
-              <a:t>24/05/2019</a:t>
+              <a:t>29/05/2019</a:t>
             </a:fld>
             <a:endParaRPr lang="es-ES"/>
           </a:p>
@@ -1956,7 +1956,7 @@
           <a:p>
             <a:fld id="{89C48F96-F5DF-4FE2-ADA7-494B7CCFAB53}" type="datetimeFigureOut">
               <a:rPr lang="es-ES" smtClean="0"/>
-              <a:t>24/05/2019</a:t>
+              <a:t>29/05/2019</a:t>
             </a:fld>
             <a:endParaRPr lang="es-ES"/>
           </a:p>
@@ -2069,7 +2069,7 @@
           <a:p>
             <a:fld id="{89C48F96-F5DF-4FE2-ADA7-494B7CCFAB53}" type="datetimeFigureOut">
               <a:rPr lang="es-ES" smtClean="0"/>
-              <a:t>24/05/2019</a:t>
+              <a:t>29/05/2019</a:t>
             </a:fld>
             <a:endParaRPr lang="es-ES"/>
           </a:p>
@@ -2380,7 +2380,7 @@
           <a:p>
             <a:fld id="{89C48F96-F5DF-4FE2-ADA7-494B7CCFAB53}" type="datetimeFigureOut">
               <a:rPr lang="es-ES" smtClean="0"/>
-              <a:t>24/05/2019</a:t>
+              <a:t>29/05/2019</a:t>
             </a:fld>
             <a:endParaRPr lang="es-ES"/>
           </a:p>
@@ -2668,7 +2668,7 @@
           <a:p>
             <a:fld id="{89C48F96-F5DF-4FE2-ADA7-494B7CCFAB53}" type="datetimeFigureOut">
               <a:rPr lang="es-ES" smtClean="0"/>
-              <a:t>24/05/2019</a:t>
+              <a:t>29/05/2019</a:t>
             </a:fld>
             <a:endParaRPr lang="es-ES"/>
           </a:p>
@@ -2909,7 +2909,7 @@
           <a:p>
             <a:fld id="{89C48F96-F5DF-4FE2-ADA7-494B7CCFAB53}" type="datetimeFigureOut">
               <a:rPr lang="es-ES" smtClean="0"/>
-              <a:t>24/05/2019</a:t>
+              <a:t>29/05/2019</a:t>
             </a:fld>
             <a:endParaRPr lang="es-ES"/>
           </a:p>
@@ -5026,7 +5026,8 @@
             <a:avLst/>
           </a:prstGeom>
           <a:ln w="19050">
-            <a:tailEnd type="triangle" w="lg" len="med"/>
+            <a:headEnd type="none" w="med" len="med"/>
+            <a:tailEnd type="none" w="med" len="med"/>
           </a:ln>
         </p:spPr>
         <p:style>
@@ -5065,8 +5066,8 @@
             <a:avLst/>
           </a:prstGeom>
           <a:ln w="19050">
-            <a:headEnd type="triangle" w="lg" len="med"/>
-            <a:tailEnd type="none" w="lg" len="med"/>
+            <a:headEnd type="none" w="med" len="med"/>
+            <a:tailEnd type="none" w="med" len="med"/>
           </a:ln>
         </p:spPr>
         <p:style>
@@ -7242,7 +7243,8 @@
             <a:avLst/>
           </a:prstGeom>
           <a:ln w="19050">
-            <a:tailEnd type="triangle" w="lg" len="med"/>
+            <a:headEnd type="none" w="med" len="med"/>
+            <a:tailEnd type="none" w="med" len="med"/>
           </a:ln>
         </p:spPr>
         <p:style>
@@ -7313,7 +7315,7 @@
         <p:spPr>
           <a:xfrm>
             <a:off x="9076968" y="5460989"/>
-            <a:ext cx="1310272" cy="369332"/>
+            <a:ext cx="1310272" cy="646331"/>
           </a:xfrm>
           <a:prstGeom prst="rect">
             <a:avLst/>
@@ -7326,15 +7328,16 @@
           </a:bodyPr>
           <a:lstStyle/>
           <a:p>
+            <a:pPr algn="ctr"/>
             <a:r>
-              <a:rPr lang="es-ES" i="1" dirty="0" err="1">
+              <a:rPr lang="es-ES" i="1" dirty="0" err="1" smtClean="0">
                 <a:latin typeface="Cambria Math" panose="02040503050406030204" pitchFamily="18" charset="0"/>
                 <a:ea typeface="Cambria Math" panose="02040503050406030204" pitchFamily="18" charset="0"/>
               </a:rPr>
-              <a:t>pred</a:t>
+              <a:t>predicted</a:t>
             </a:r>
             <a:r>
-              <a:rPr lang="es-ES" i="1" dirty="0">
+              <a:rPr lang="es-ES" i="1" dirty="0" smtClean="0">
                 <a:latin typeface="Cambria Math" panose="02040503050406030204" pitchFamily="18" charset="0"/>
                 <a:ea typeface="Cambria Math" panose="02040503050406030204" pitchFamily="18" charset="0"/>
               </a:rPr>

</xml_diff>